<commit_message>
add cpp wrapper lib for c lib
</commit_message>
<xml_diff>
--- a/doc/benchmark.pptx
+++ b/doc/benchmark.pptx
@@ -114,7 +114,7 @@
 </file>
 
 <file path=ppt/charts/chart1.xml><?xml version="1.0" encoding="utf-8"?>
-<c:chartSpace xmlns:c="http://schemas.openxmlformats.org/drawingml/2006/chart" xmlns:a="http://schemas.openxmlformats.org/drawingml/2006/main" xmlns:r="http://schemas.openxmlformats.org/officeDocument/2006/relationships">
+<c:chartSpace xmlns:c="http://schemas.openxmlformats.org/drawingml/2006/chart" xmlns:a="http://schemas.openxmlformats.org/drawingml/2006/main" xmlns:r="http://schemas.openxmlformats.org/officeDocument/2006/relationships" xmlns:c16r2="http://schemas.microsoft.com/office/drawing/2015/06/chart">
   <c:date1904 val="0"/>
   <c:lang val="zh-CN"/>
   <c:roundedCorners val="0"/>
@@ -147,14 +147,13 @@
               </a:defRPr>
             </a:pPr>
             <a:r>
-              <a:rPr lang="en-US" altLang="zh-CN" dirty="0" smtClean="0"/>
+              <a:rPr lang="en-US" altLang="zh-CN" dirty="0"/>
               <a:t>IOPS</a:t>
             </a:r>
             <a:endParaRPr lang="zh-CN" altLang="en-US" dirty="0"/>
           </a:p>
         </c:rich>
       </c:tx>
-      <c:layout/>
       <c:overlay val="0"/>
       <c:spPr>
         <a:noFill/>
@@ -256,6 +255,11 @@
               </c:numCache>
             </c:numRef>
           </c:val>
+          <c:extLst>
+            <c:ext xmlns:c16="http://schemas.microsoft.com/office/drawing/2014/chart" uri="{C3380CC4-5D6E-409C-BE32-E72D297353CC}">
+              <c16:uniqueId val="{00000000-6165-B949-8E6F-FB2485598119}"/>
+            </c:ext>
+          </c:extLst>
         </c:ser>
         <c:ser>
           <c:idx val="1"/>
@@ -322,6 +326,11 @@
               </c:numCache>
             </c:numRef>
           </c:val>
+          <c:extLst>
+            <c:ext xmlns:c16="http://schemas.microsoft.com/office/drawing/2014/chart" uri="{C3380CC4-5D6E-409C-BE32-E72D297353CC}">
+              <c16:uniqueId val="{00000001-6165-B949-8E6F-FB2485598119}"/>
+            </c:ext>
+          </c:extLst>
         </c:ser>
         <c:ser>
           <c:idx val="2"/>
@@ -388,6 +397,11 @@
               </c:numCache>
             </c:numRef>
           </c:val>
+          <c:extLst>
+            <c:ext xmlns:c16="http://schemas.microsoft.com/office/drawing/2014/chart" uri="{C3380CC4-5D6E-409C-BE32-E72D297353CC}">
+              <c16:uniqueId val="{00000002-6165-B949-8E6F-FB2485598119}"/>
+            </c:ext>
+          </c:extLst>
         </c:ser>
         <c:ser>
           <c:idx val="3"/>
@@ -454,6 +468,11 @@
               </c:numCache>
             </c:numRef>
           </c:val>
+          <c:extLst>
+            <c:ext xmlns:c16="http://schemas.microsoft.com/office/drawing/2014/chart" uri="{C3380CC4-5D6E-409C-BE32-E72D297353CC}">
+              <c16:uniqueId val="{00000003-6165-B949-8E6F-FB2485598119}"/>
+            </c:ext>
+          </c:extLst>
         </c:ser>
         <c:ser>
           <c:idx val="4"/>
@@ -520,6 +539,11 @@
               </c:numCache>
             </c:numRef>
           </c:val>
+          <c:extLst>
+            <c:ext xmlns:c16="http://schemas.microsoft.com/office/drawing/2014/chart" uri="{C3380CC4-5D6E-409C-BE32-E72D297353CC}">
+              <c16:uniqueId val="{00000004-6165-B949-8E6F-FB2485598119}"/>
+            </c:ext>
+          </c:extLst>
         </c:ser>
         <c:dLbls>
           <c:showLegendKey val="0"/>
@@ -561,18 +585,16 @@
                   </a:defRPr>
                 </a:pPr>
                 <a:r>
-                  <a:rPr lang="en-US" altLang="zh-CN" dirty="0" smtClean="0"/>
+                  <a:rPr lang="en-US" altLang="zh-CN" dirty="0"/>
                   <a:t>IO</a:t>
                 </a:r>
                 <a:r>
-                  <a:rPr lang="zh-CN" altLang="en-US" dirty="0" smtClean="0"/>
+                  <a:rPr lang="zh-CN" altLang="en-US" dirty="0"/>
                   <a:t>性能对比</a:t>
                 </a:r>
-                <a:endParaRPr lang="zh-CN" altLang="en-US" dirty="0"/>
               </a:p>
             </c:rich>
           </c:tx>
-          <c:layout/>
           <c:overlay val="0"/>
           <c:spPr>
             <a:noFill/>
@@ -687,14 +709,13 @@
                   </a:defRPr>
                 </a:pPr>
                 <a:r>
-                  <a:rPr lang="en-US" altLang="zh-CN" dirty="0" smtClean="0"/>
+                  <a:rPr lang="en-US" altLang="zh-CN" dirty="0"/>
                   <a:t>QPS</a:t>
                 </a:r>
                 <a:endParaRPr lang="zh-CN" altLang="en-US" dirty="0"/>
               </a:p>
             </c:rich>
           </c:tx>
-          <c:layout/>
           <c:overlay val="0"/>
           <c:spPr>
             <a:noFill/>
@@ -769,7 +790,6 @@
     </c:plotArea>
     <c:legend>
       <c:legendPos val="b"/>
-      <c:layout/>
       <c:overlay val="0"/>
       <c:spPr>
         <a:noFill/>
@@ -827,7 +847,7 @@
 </file>
 
 <file path=ppt/charts/chart2.xml><?xml version="1.0" encoding="utf-8"?>
-<c:chartSpace xmlns:c="http://schemas.openxmlformats.org/drawingml/2006/chart" xmlns:a="http://schemas.openxmlformats.org/drawingml/2006/main" xmlns:r="http://schemas.openxmlformats.org/officeDocument/2006/relationships">
+<c:chartSpace xmlns:c="http://schemas.openxmlformats.org/drawingml/2006/chart" xmlns:a="http://schemas.openxmlformats.org/drawingml/2006/main" xmlns:r="http://schemas.openxmlformats.org/officeDocument/2006/relationships" xmlns:c16r2="http://schemas.microsoft.com/office/drawing/2015/06/chart">
   <c:date1904 val="0"/>
   <c:lang val="zh-CN"/>
   <c:roundedCorners val="0"/>
@@ -860,14 +880,13 @@
               </a:defRPr>
             </a:pPr>
             <a:r>
-              <a:rPr lang="en-US" altLang="zh-CN" dirty="0" smtClean="0"/>
+              <a:rPr lang="en-US" altLang="zh-CN" dirty="0"/>
               <a:t>IOPS</a:t>
             </a:r>
             <a:endParaRPr lang="zh-CN" altLang="en-US" dirty="0"/>
           </a:p>
         </c:rich>
       </c:tx>
-      <c:layout/>
       <c:overlay val="0"/>
       <c:spPr>
         <a:noFill/>
@@ -969,6 +988,11 @@
               </c:numCache>
             </c:numRef>
           </c:val>
+          <c:extLst>
+            <c:ext xmlns:c16="http://schemas.microsoft.com/office/drawing/2014/chart" uri="{C3380CC4-5D6E-409C-BE32-E72D297353CC}">
+              <c16:uniqueId val="{00000000-4FCA-614E-A6FB-41F79C847C35}"/>
+            </c:ext>
+          </c:extLst>
         </c:ser>
         <c:ser>
           <c:idx val="1"/>
@@ -1035,6 +1059,11 @@
               </c:numCache>
             </c:numRef>
           </c:val>
+          <c:extLst>
+            <c:ext xmlns:c16="http://schemas.microsoft.com/office/drawing/2014/chart" uri="{C3380CC4-5D6E-409C-BE32-E72D297353CC}">
+              <c16:uniqueId val="{00000001-4FCA-614E-A6FB-41F79C847C35}"/>
+            </c:ext>
+          </c:extLst>
         </c:ser>
         <c:ser>
           <c:idx val="2"/>
@@ -1101,6 +1130,11 @@
               </c:numCache>
             </c:numRef>
           </c:val>
+          <c:extLst>
+            <c:ext xmlns:c16="http://schemas.microsoft.com/office/drawing/2014/chart" uri="{C3380CC4-5D6E-409C-BE32-E72D297353CC}">
+              <c16:uniqueId val="{00000002-4FCA-614E-A6FB-41F79C847C35}"/>
+            </c:ext>
+          </c:extLst>
         </c:ser>
         <c:ser>
           <c:idx val="3"/>
@@ -1167,6 +1201,11 @@
               </c:numCache>
             </c:numRef>
           </c:val>
+          <c:extLst>
+            <c:ext xmlns:c16="http://schemas.microsoft.com/office/drawing/2014/chart" uri="{C3380CC4-5D6E-409C-BE32-E72D297353CC}">
+              <c16:uniqueId val="{00000003-4FCA-614E-A6FB-41F79C847C35}"/>
+            </c:ext>
+          </c:extLst>
         </c:ser>
         <c:dLbls>
           <c:showLegendKey val="0"/>
@@ -1208,18 +1247,16 @@
                   </a:defRPr>
                 </a:pPr>
                 <a:r>
-                  <a:rPr lang="en-US" altLang="zh-CN" dirty="0" smtClean="0"/>
+                  <a:rPr lang="en-US" altLang="zh-CN" dirty="0"/>
                   <a:t>IO</a:t>
                 </a:r>
                 <a:r>
-                  <a:rPr lang="zh-CN" altLang="en-US" dirty="0" smtClean="0"/>
+                  <a:rPr lang="zh-CN" altLang="en-US" dirty="0"/>
                   <a:t>性能对比</a:t>
                 </a:r>
-                <a:endParaRPr lang="zh-CN" altLang="en-US" dirty="0"/>
               </a:p>
             </c:rich>
           </c:tx>
-          <c:layout/>
           <c:overlay val="0"/>
           <c:spPr>
             <a:noFill/>
@@ -1334,14 +1371,13 @@
                   </a:defRPr>
                 </a:pPr>
                 <a:r>
-                  <a:rPr lang="en-US" altLang="zh-CN" dirty="0" smtClean="0"/>
+                  <a:rPr lang="en-US" altLang="zh-CN" dirty="0"/>
                   <a:t>QPS</a:t>
                 </a:r>
                 <a:endParaRPr lang="zh-CN" altLang="en-US" dirty="0"/>
               </a:p>
             </c:rich>
           </c:tx>
-          <c:layout/>
           <c:overlay val="0"/>
           <c:spPr>
             <a:noFill/>
@@ -1416,7 +1452,6 @@
     </c:plotArea>
     <c:legend>
       <c:legendPos val="b"/>
-      <c:layout/>
       <c:overlay val="0"/>
       <c:spPr>
         <a:noFill/>
@@ -2601,10 +2636,9 @@
           </a:lstStyle>
           <a:p>
             <a:r>
-              <a:rPr lang="zh-CN" altLang="en-US" smtClean="0"/>
+              <a:rPr lang="zh-CN" altLang="en-US"/>
               <a:t>单击此处编辑母版标题样式</a:t>
             </a:r>
-            <a:endParaRPr lang="zh-CN" altLang="en-US"/>
           </a:p>
         </p:txBody>
       </p:sp>
@@ -2666,10 +2700,9 @@
           </a:lstStyle>
           <a:p>
             <a:r>
-              <a:rPr lang="zh-CN" altLang="en-US" smtClean="0"/>
+              <a:rPr lang="zh-CN" altLang="en-US"/>
               <a:t>单击此处编辑母版副标题样式</a:t>
             </a:r>
-            <a:endParaRPr lang="zh-CN" altLang="en-US"/>
           </a:p>
         </p:txBody>
       </p:sp>
@@ -2690,7 +2723,7 @@
           <a:p>
             <a:fld id="{8D0B3DFF-72D8-4763-AFA8-AF2C668498FE}" type="datetimeFigureOut">
               <a:rPr lang="zh-CN" altLang="en-US" smtClean="0"/>
-              <a:t>2018/2/26</a:t>
+              <a:t>2020/6/4</a:t>
             </a:fld>
             <a:endParaRPr lang="zh-CN" altLang="en-US"/>
           </a:p>
@@ -2784,10 +2817,9 @@
           <a:lstStyle/>
           <a:p>
             <a:r>
-              <a:rPr lang="zh-CN" altLang="en-US" smtClean="0"/>
+              <a:rPr lang="zh-CN" altLang="en-US"/>
               <a:t>单击此处编辑母版标题样式</a:t>
             </a:r>
-            <a:endParaRPr lang="zh-CN" altLang="en-US"/>
           </a:p>
         </p:txBody>
       </p:sp>
@@ -2808,38 +2840,37 @@
           <a:p>
             <a:pPr lvl="0"/>
             <a:r>
-              <a:rPr lang="zh-CN" altLang="en-US" smtClean="0"/>
+              <a:rPr lang="zh-CN" altLang="en-US"/>
               <a:t>单击此处编辑母版文本样式</a:t>
             </a:r>
           </a:p>
           <a:p>
             <a:pPr lvl="1"/>
             <a:r>
-              <a:rPr lang="zh-CN" altLang="en-US" smtClean="0"/>
+              <a:rPr lang="zh-CN" altLang="en-US"/>
               <a:t>第二级</a:t>
             </a:r>
           </a:p>
           <a:p>
             <a:pPr lvl="2"/>
             <a:r>
-              <a:rPr lang="zh-CN" altLang="en-US" smtClean="0"/>
+              <a:rPr lang="zh-CN" altLang="en-US"/>
               <a:t>第三级</a:t>
             </a:r>
           </a:p>
           <a:p>
             <a:pPr lvl="3"/>
             <a:r>
-              <a:rPr lang="zh-CN" altLang="en-US" smtClean="0"/>
+              <a:rPr lang="zh-CN" altLang="en-US"/>
               <a:t>第四级</a:t>
             </a:r>
           </a:p>
           <a:p>
             <a:pPr lvl="4"/>
             <a:r>
-              <a:rPr lang="zh-CN" altLang="en-US" smtClean="0"/>
+              <a:rPr lang="zh-CN" altLang="en-US"/>
               <a:t>第五级</a:t>
             </a:r>
-            <a:endParaRPr lang="zh-CN" altLang="en-US"/>
           </a:p>
         </p:txBody>
       </p:sp>
@@ -2860,7 +2891,7 @@
           <a:p>
             <a:fld id="{8D0B3DFF-72D8-4763-AFA8-AF2C668498FE}" type="datetimeFigureOut">
               <a:rPr lang="zh-CN" altLang="en-US" smtClean="0"/>
-              <a:t>2018/2/26</a:t>
+              <a:t>2020/6/4</a:t>
             </a:fld>
             <a:endParaRPr lang="zh-CN" altLang="en-US"/>
           </a:p>
@@ -2959,10 +2990,9 @@
           <a:lstStyle/>
           <a:p>
             <a:r>
-              <a:rPr lang="zh-CN" altLang="en-US" smtClean="0"/>
+              <a:rPr lang="zh-CN" altLang="en-US"/>
               <a:t>单击此处编辑母版标题样式</a:t>
             </a:r>
-            <a:endParaRPr lang="zh-CN" altLang="en-US"/>
           </a:p>
         </p:txBody>
       </p:sp>
@@ -2988,38 +3018,37 @@
           <a:p>
             <a:pPr lvl="0"/>
             <a:r>
-              <a:rPr lang="zh-CN" altLang="en-US" smtClean="0"/>
+              <a:rPr lang="zh-CN" altLang="en-US"/>
               <a:t>单击此处编辑母版文本样式</a:t>
             </a:r>
           </a:p>
           <a:p>
             <a:pPr lvl="1"/>
             <a:r>
-              <a:rPr lang="zh-CN" altLang="en-US" smtClean="0"/>
+              <a:rPr lang="zh-CN" altLang="en-US"/>
               <a:t>第二级</a:t>
             </a:r>
           </a:p>
           <a:p>
             <a:pPr lvl="2"/>
             <a:r>
-              <a:rPr lang="zh-CN" altLang="en-US" smtClean="0"/>
+              <a:rPr lang="zh-CN" altLang="en-US"/>
               <a:t>第三级</a:t>
             </a:r>
           </a:p>
           <a:p>
             <a:pPr lvl="3"/>
             <a:r>
-              <a:rPr lang="zh-CN" altLang="en-US" smtClean="0"/>
+              <a:rPr lang="zh-CN" altLang="en-US"/>
               <a:t>第四级</a:t>
             </a:r>
           </a:p>
           <a:p>
             <a:pPr lvl="4"/>
             <a:r>
-              <a:rPr lang="zh-CN" altLang="en-US" smtClean="0"/>
+              <a:rPr lang="zh-CN" altLang="en-US"/>
               <a:t>第五级</a:t>
             </a:r>
-            <a:endParaRPr lang="zh-CN" altLang="en-US"/>
           </a:p>
         </p:txBody>
       </p:sp>
@@ -3040,7 +3069,7 @@
           <a:p>
             <a:fld id="{8D0B3DFF-72D8-4763-AFA8-AF2C668498FE}" type="datetimeFigureOut">
               <a:rPr lang="zh-CN" altLang="en-US" smtClean="0"/>
-              <a:t>2018/2/26</a:t>
+              <a:t>2020/6/4</a:t>
             </a:fld>
             <a:endParaRPr lang="zh-CN" altLang="en-US"/>
           </a:p>
@@ -3134,10 +3163,9 @@
           <a:lstStyle/>
           <a:p>
             <a:r>
-              <a:rPr lang="zh-CN" altLang="en-US" smtClean="0"/>
+              <a:rPr lang="zh-CN" altLang="en-US"/>
               <a:t>单击此处编辑母版标题样式</a:t>
             </a:r>
-            <a:endParaRPr lang="zh-CN" altLang="en-US"/>
           </a:p>
         </p:txBody>
       </p:sp>
@@ -3158,38 +3186,37 @@
           <a:p>
             <a:pPr lvl="0"/>
             <a:r>
-              <a:rPr lang="zh-CN" altLang="en-US" smtClean="0"/>
+              <a:rPr lang="zh-CN" altLang="en-US"/>
               <a:t>单击此处编辑母版文本样式</a:t>
             </a:r>
           </a:p>
           <a:p>
             <a:pPr lvl="1"/>
             <a:r>
-              <a:rPr lang="zh-CN" altLang="en-US" smtClean="0"/>
+              <a:rPr lang="zh-CN" altLang="en-US"/>
               <a:t>第二级</a:t>
             </a:r>
           </a:p>
           <a:p>
             <a:pPr lvl="2"/>
             <a:r>
-              <a:rPr lang="zh-CN" altLang="en-US" smtClean="0"/>
+              <a:rPr lang="zh-CN" altLang="en-US"/>
               <a:t>第三级</a:t>
             </a:r>
           </a:p>
           <a:p>
             <a:pPr lvl="3"/>
             <a:r>
-              <a:rPr lang="zh-CN" altLang="en-US" smtClean="0"/>
+              <a:rPr lang="zh-CN" altLang="en-US"/>
               <a:t>第四级</a:t>
             </a:r>
           </a:p>
           <a:p>
             <a:pPr lvl="4"/>
             <a:r>
-              <a:rPr lang="zh-CN" altLang="en-US" smtClean="0"/>
+              <a:rPr lang="zh-CN" altLang="en-US"/>
               <a:t>第五级</a:t>
             </a:r>
-            <a:endParaRPr lang="zh-CN" altLang="en-US"/>
           </a:p>
         </p:txBody>
       </p:sp>
@@ -3210,7 +3237,7 @@
           <a:p>
             <a:fld id="{8D0B3DFF-72D8-4763-AFA8-AF2C668498FE}" type="datetimeFigureOut">
               <a:rPr lang="zh-CN" altLang="en-US" smtClean="0"/>
-              <a:t>2018/2/26</a:t>
+              <a:t>2020/6/4</a:t>
             </a:fld>
             <a:endParaRPr lang="zh-CN" altLang="en-US"/>
           </a:p>
@@ -3313,10 +3340,9 @@
           </a:lstStyle>
           <a:p>
             <a:r>
-              <a:rPr lang="zh-CN" altLang="en-US" smtClean="0"/>
+              <a:rPr lang="zh-CN" altLang="en-US"/>
               <a:t>单击此处编辑母版标题样式</a:t>
             </a:r>
-            <a:endParaRPr lang="zh-CN" altLang="en-US"/>
           </a:p>
         </p:txBody>
       </p:sp>
@@ -3433,7 +3459,7 @@
           <a:p>
             <a:pPr lvl="0"/>
             <a:r>
-              <a:rPr lang="zh-CN" altLang="en-US" smtClean="0"/>
+              <a:rPr lang="zh-CN" altLang="en-US"/>
               <a:t>单击此处编辑母版文本样式</a:t>
             </a:r>
           </a:p>
@@ -3456,7 +3482,7 @@
           <a:p>
             <a:fld id="{8D0B3DFF-72D8-4763-AFA8-AF2C668498FE}" type="datetimeFigureOut">
               <a:rPr lang="zh-CN" altLang="en-US" smtClean="0"/>
-              <a:t>2018/2/26</a:t>
+              <a:t>2020/6/4</a:t>
             </a:fld>
             <a:endParaRPr lang="zh-CN" altLang="en-US"/>
           </a:p>
@@ -3550,10 +3576,9 @@
           <a:lstStyle/>
           <a:p>
             <a:r>
-              <a:rPr lang="zh-CN" altLang="en-US" smtClean="0"/>
+              <a:rPr lang="zh-CN" altLang="en-US"/>
               <a:t>单击此处编辑母版标题样式</a:t>
             </a:r>
-            <a:endParaRPr lang="zh-CN" altLang="en-US"/>
           </a:p>
         </p:txBody>
       </p:sp>
@@ -3579,38 +3604,37 @@
           <a:p>
             <a:pPr lvl="0"/>
             <a:r>
-              <a:rPr lang="zh-CN" altLang="en-US" smtClean="0"/>
+              <a:rPr lang="zh-CN" altLang="en-US"/>
               <a:t>单击此处编辑母版文本样式</a:t>
             </a:r>
           </a:p>
           <a:p>
             <a:pPr lvl="1"/>
             <a:r>
-              <a:rPr lang="zh-CN" altLang="en-US" smtClean="0"/>
+              <a:rPr lang="zh-CN" altLang="en-US"/>
               <a:t>第二级</a:t>
             </a:r>
           </a:p>
           <a:p>
             <a:pPr lvl="2"/>
             <a:r>
-              <a:rPr lang="zh-CN" altLang="en-US" smtClean="0"/>
+              <a:rPr lang="zh-CN" altLang="en-US"/>
               <a:t>第三级</a:t>
             </a:r>
           </a:p>
           <a:p>
             <a:pPr lvl="3"/>
             <a:r>
-              <a:rPr lang="zh-CN" altLang="en-US" smtClean="0"/>
+              <a:rPr lang="zh-CN" altLang="en-US"/>
               <a:t>第四级</a:t>
             </a:r>
           </a:p>
           <a:p>
             <a:pPr lvl="4"/>
             <a:r>
-              <a:rPr lang="zh-CN" altLang="en-US" smtClean="0"/>
+              <a:rPr lang="zh-CN" altLang="en-US"/>
               <a:t>第五级</a:t>
             </a:r>
-            <a:endParaRPr lang="zh-CN" altLang="en-US"/>
           </a:p>
         </p:txBody>
       </p:sp>
@@ -3636,38 +3660,37 @@
           <a:p>
             <a:pPr lvl="0"/>
             <a:r>
-              <a:rPr lang="zh-CN" altLang="en-US" smtClean="0"/>
+              <a:rPr lang="zh-CN" altLang="en-US"/>
               <a:t>单击此处编辑母版文本样式</a:t>
             </a:r>
           </a:p>
           <a:p>
             <a:pPr lvl="1"/>
             <a:r>
-              <a:rPr lang="zh-CN" altLang="en-US" smtClean="0"/>
+              <a:rPr lang="zh-CN" altLang="en-US"/>
               <a:t>第二级</a:t>
             </a:r>
           </a:p>
           <a:p>
             <a:pPr lvl="2"/>
             <a:r>
-              <a:rPr lang="zh-CN" altLang="en-US" smtClean="0"/>
+              <a:rPr lang="zh-CN" altLang="en-US"/>
               <a:t>第三级</a:t>
             </a:r>
           </a:p>
           <a:p>
             <a:pPr lvl="3"/>
             <a:r>
-              <a:rPr lang="zh-CN" altLang="en-US" smtClean="0"/>
+              <a:rPr lang="zh-CN" altLang="en-US"/>
               <a:t>第四级</a:t>
             </a:r>
           </a:p>
           <a:p>
             <a:pPr lvl="4"/>
             <a:r>
-              <a:rPr lang="zh-CN" altLang="en-US" smtClean="0"/>
+              <a:rPr lang="zh-CN" altLang="en-US"/>
               <a:t>第五级</a:t>
             </a:r>
-            <a:endParaRPr lang="zh-CN" altLang="en-US"/>
           </a:p>
         </p:txBody>
       </p:sp>
@@ -3688,7 +3711,7 @@
           <a:p>
             <a:fld id="{8D0B3DFF-72D8-4763-AFA8-AF2C668498FE}" type="datetimeFigureOut">
               <a:rPr lang="zh-CN" altLang="en-US" smtClean="0"/>
-              <a:t>2018/2/26</a:t>
+              <a:t>2020/6/4</a:t>
             </a:fld>
             <a:endParaRPr lang="zh-CN" altLang="en-US"/>
           </a:p>
@@ -3787,10 +3810,9 @@
           <a:lstStyle/>
           <a:p>
             <a:r>
-              <a:rPr lang="zh-CN" altLang="en-US" smtClean="0"/>
+              <a:rPr lang="zh-CN" altLang="en-US"/>
               <a:t>单击此处编辑母版标题样式</a:t>
             </a:r>
-            <a:endParaRPr lang="zh-CN" altLang="en-US"/>
           </a:p>
         </p:txBody>
       </p:sp>
@@ -3853,7 +3875,7 @@
           <a:p>
             <a:pPr lvl="0"/>
             <a:r>
-              <a:rPr lang="zh-CN" altLang="en-US" smtClean="0"/>
+              <a:rPr lang="zh-CN" altLang="en-US"/>
               <a:t>单击此处编辑母版文本样式</a:t>
             </a:r>
           </a:p>
@@ -3881,38 +3903,37 @@
           <a:p>
             <a:pPr lvl="0"/>
             <a:r>
-              <a:rPr lang="zh-CN" altLang="en-US" smtClean="0"/>
+              <a:rPr lang="zh-CN" altLang="en-US"/>
               <a:t>单击此处编辑母版文本样式</a:t>
             </a:r>
           </a:p>
           <a:p>
             <a:pPr lvl="1"/>
             <a:r>
-              <a:rPr lang="zh-CN" altLang="en-US" smtClean="0"/>
+              <a:rPr lang="zh-CN" altLang="en-US"/>
               <a:t>第二级</a:t>
             </a:r>
           </a:p>
           <a:p>
             <a:pPr lvl="2"/>
             <a:r>
-              <a:rPr lang="zh-CN" altLang="en-US" smtClean="0"/>
+              <a:rPr lang="zh-CN" altLang="en-US"/>
               <a:t>第三级</a:t>
             </a:r>
           </a:p>
           <a:p>
             <a:pPr lvl="3"/>
             <a:r>
-              <a:rPr lang="zh-CN" altLang="en-US" smtClean="0"/>
+              <a:rPr lang="zh-CN" altLang="en-US"/>
               <a:t>第四级</a:t>
             </a:r>
           </a:p>
           <a:p>
             <a:pPr lvl="4"/>
             <a:r>
-              <a:rPr lang="zh-CN" altLang="en-US" smtClean="0"/>
+              <a:rPr lang="zh-CN" altLang="en-US"/>
               <a:t>第五级</a:t>
             </a:r>
-            <a:endParaRPr lang="zh-CN" altLang="en-US"/>
           </a:p>
         </p:txBody>
       </p:sp>
@@ -3975,7 +3996,7 @@
           <a:p>
             <a:pPr lvl="0"/>
             <a:r>
-              <a:rPr lang="zh-CN" altLang="en-US" smtClean="0"/>
+              <a:rPr lang="zh-CN" altLang="en-US"/>
               <a:t>单击此处编辑母版文本样式</a:t>
             </a:r>
           </a:p>
@@ -4003,38 +4024,37 @@
           <a:p>
             <a:pPr lvl="0"/>
             <a:r>
-              <a:rPr lang="zh-CN" altLang="en-US" smtClean="0"/>
+              <a:rPr lang="zh-CN" altLang="en-US"/>
               <a:t>单击此处编辑母版文本样式</a:t>
             </a:r>
           </a:p>
           <a:p>
             <a:pPr lvl="1"/>
             <a:r>
-              <a:rPr lang="zh-CN" altLang="en-US" smtClean="0"/>
+              <a:rPr lang="zh-CN" altLang="en-US"/>
               <a:t>第二级</a:t>
             </a:r>
           </a:p>
           <a:p>
             <a:pPr lvl="2"/>
             <a:r>
-              <a:rPr lang="zh-CN" altLang="en-US" smtClean="0"/>
+              <a:rPr lang="zh-CN" altLang="en-US"/>
               <a:t>第三级</a:t>
             </a:r>
           </a:p>
           <a:p>
             <a:pPr lvl="3"/>
             <a:r>
-              <a:rPr lang="zh-CN" altLang="en-US" smtClean="0"/>
+              <a:rPr lang="zh-CN" altLang="en-US"/>
               <a:t>第四级</a:t>
             </a:r>
           </a:p>
           <a:p>
             <a:pPr lvl="4"/>
             <a:r>
-              <a:rPr lang="zh-CN" altLang="en-US" smtClean="0"/>
+              <a:rPr lang="zh-CN" altLang="en-US"/>
               <a:t>第五级</a:t>
             </a:r>
-            <a:endParaRPr lang="zh-CN" altLang="en-US"/>
           </a:p>
         </p:txBody>
       </p:sp>
@@ -4055,7 +4075,7 @@
           <a:p>
             <a:fld id="{8D0B3DFF-72D8-4763-AFA8-AF2C668498FE}" type="datetimeFigureOut">
               <a:rPr lang="zh-CN" altLang="en-US" smtClean="0"/>
-              <a:t>2018/2/26</a:t>
+              <a:t>2020/6/4</a:t>
             </a:fld>
             <a:endParaRPr lang="zh-CN" altLang="en-US"/>
           </a:p>
@@ -4149,10 +4169,9 @@
           <a:lstStyle/>
           <a:p>
             <a:r>
-              <a:rPr lang="zh-CN" altLang="en-US" smtClean="0"/>
+              <a:rPr lang="zh-CN" altLang="en-US"/>
               <a:t>单击此处编辑母版标题样式</a:t>
             </a:r>
-            <a:endParaRPr lang="zh-CN" altLang="en-US"/>
           </a:p>
         </p:txBody>
       </p:sp>
@@ -4173,7 +4192,7 @@
           <a:p>
             <a:fld id="{8D0B3DFF-72D8-4763-AFA8-AF2C668498FE}" type="datetimeFigureOut">
               <a:rPr lang="zh-CN" altLang="en-US" smtClean="0"/>
-              <a:t>2018/2/26</a:t>
+              <a:t>2020/6/4</a:t>
             </a:fld>
             <a:endParaRPr lang="zh-CN" altLang="en-US"/>
           </a:p>
@@ -4268,7 +4287,7 @@
           <a:p>
             <a:fld id="{8D0B3DFF-72D8-4763-AFA8-AF2C668498FE}" type="datetimeFigureOut">
               <a:rPr lang="zh-CN" altLang="en-US" smtClean="0"/>
-              <a:t>2018/2/26</a:t>
+              <a:t>2020/6/4</a:t>
             </a:fld>
             <a:endParaRPr lang="zh-CN" altLang="en-US"/>
           </a:p>
@@ -4371,10 +4390,9 @@
           </a:lstStyle>
           <a:p>
             <a:r>
-              <a:rPr lang="zh-CN" altLang="en-US" smtClean="0"/>
+              <a:rPr lang="zh-CN" altLang="en-US"/>
               <a:t>单击此处编辑母版标题样式</a:t>
             </a:r>
-            <a:endParaRPr lang="zh-CN" altLang="en-US"/>
           </a:p>
         </p:txBody>
       </p:sp>
@@ -4428,38 +4446,37 @@
           <a:p>
             <a:pPr lvl="0"/>
             <a:r>
-              <a:rPr lang="zh-CN" altLang="en-US" smtClean="0"/>
+              <a:rPr lang="zh-CN" altLang="en-US"/>
               <a:t>单击此处编辑母版文本样式</a:t>
             </a:r>
           </a:p>
           <a:p>
             <a:pPr lvl="1"/>
             <a:r>
-              <a:rPr lang="zh-CN" altLang="en-US" smtClean="0"/>
+              <a:rPr lang="zh-CN" altLang="en-US"/>
               <a:t>第二级</a:t>
             </a:r>
           </a:p>
           <a:p>
             <a:pPr lvl="2"/>
             <a:r>
-              <a:rPr lang="zh-CN" altLang="en-US" smtClean="0"/>
+              <a:rPr lang="zh-CN" altLang="en-US"/>
               <a:t>第三级</a:t>
             </a:r>
           </a:p>
           <a:p>
             <a:pPr lvl="3"/>
             <a:r>
-              <a:rPr lang="zh-CN" altLang="en-US" smtClean="0"/>
+              <a:rPr lang="zh-CN" altLang="en-US"/>
               <a:t>第四级</a:t>
             </a:r>
           </a:p>
           <a:p>
             <a:pPr lvl="4"/>
             <a:r>
-              <a:rPr lang="zh-CN" altLang="en-US" smtClean="0"/>
+              <a:rPr lang="zh-CN" altLang="en-US"/>
               <a:t>第五级</a:t>
             </a:r>
-            <a:endParaRPr lang="zh-CN" altLang="en-US"/>
           </a:p>
         </p:txBody>
       </p:sp>
@@ -4522,7 +4539,7 @@
           <a:p>
             <a:pPr lvl="0"/>
             <a:r>
-              <a:rPr lang="zh-CN" altLang="en-US" smtClean="0"/>
+              <a:rPr lang="zh-CN" altLang="en-US"/>
               <a:t>单击此处编辑母版文本样式</a:t>
             </a:r>
           </a:p>
@@ -4545,7 +4562,7 @@
           <a:p>
             <a:fld id="{8D0B3DFF-72D8-4763-AFA8-AF2C668498FE}" type="datetimeFigureOut">
               <a:rPr lang="zh-CN" altLang="en-US" smtClean="0"/>
-              <a:t>2018/2/26</a:t>
+              <a:t>2020/6/4</a:t>
             </a:fld>
             <a:endParaRPr lang="zh-CN" altLang="en-US"/>
           </a:p>
@@ -4648,10 +4665,9 @@
           </a:lstStyle>
           <a:p>
             <a:r>
-              <a:rPr lang="zh-CN" altLang="en-US" smtClean="0"/>
+              <a:rPr lang="zh-CN" altLang="en-US"/>
               <a:t>单击此处编辑母版标题样式</a:t>
             </a:r>
-            <a:endParaRPr lang="zh-CN" altLang="en-US"/>
           </a:p>
         </p:txBody>
       </p:sp>
@@ -4713,10 +4729,9 @@
           </a:lstStyle>
           <a:p>
             <a:r>
-              <a:rPr lang="zh-CN" altLang="en-US" smtClean="0"/>
+              <a:rPr lang="zh-CN" altLang="en-US"/>
               <a:t>单击图标添加图片</a:t>
             </a:r>
-            <a:endParaRPr lang="zh-CN" altLang="en-US"/>
           </a:p>
         </p:txBody>
       </p:sp>
@@ -4779,7 +4794,7 @@
           <a:p>
             <a:pPr lvl="0"/>
             <a:r>
-              <a:rPr lang="zh-CN" altLang="en-US" smtClean="0"/>
+              <a:rPr lang="zh-CN" altLang="en-US"/>
               <a:t>单击此处编辑母版文本样式</a:t>
             </a:r>
           </a:p>
@@ -4802,7 +4817,7 @@
           <a:p>
             <a:fld id="{8D0B3DFF-72D8-4763-AFA8-AF2C668498FE}" type="datetimeFigureOut">
               <a:rPr lang="zh-CN" altLang="en-US" smtClean="0"/>
-              <a:t>2018/2/26</a:t>
+              <a:t>2020/6/4</a:t>
             </a:fld>
             <a:endParaRPr lang="zh-CN" altLang="en-US"/>
           </a:p>
@@ -4911,10 +4926,9 @@
           <a:lstStyle/>
           <a:p>
             <a:r>
-              <a:rPr lang="zh-CN" altLang="en-US" smtClean="0"/>
+              <a:rPr lang="zh-CN" altLang="en-US"/>
               <a:t>单击此处编辑母版标题样式</a:t>
             </a:r>
-            <a:endParaRPr lang="zh-CN" altLang="en-US"/>
           </a:p>
         </p:txBody>
       </p:sp>
@@ -4945,38 +4959,37 @@
           <a:p>
             <a:pPr lvl="0"/>
             <a:r>
-              <a:rPr lang="zh-CN" altLang="en-US" smtClean="0"/>
+              <a:rPr lang="zh-CN" altLang="en-US"/>
               <a:t>单击此处编辑母版文本样式</a:t>
             </a:r>
           </a:p>
           <a:p>
             <a:pPr lvl="1"/>
             <a:r>
-              <a:rPr lang="zh-CN" altLang="en-US" smtClean="0"/>
+              <a:rPr lang="zh-CN" altLang="en-US"/>
               <a:t>第二级</a:t>
             </a:r>
           </a:p>
           <a:p>
             <a:pPr lvl="2"/>
             <a:r>
-              <a:rPr lang="zh-CN" altLang="en-US" smtClean="0"/>
+              <a:rPr lang="zh-CN" altLang="en-US"/>
               <a:t>第三级</a:t>
             </a:r>
           </a:p>
           <a:p>
             <a:pPr lvl="3"/>
             <a:r>
-              <a:rPr lang="zh-CN" altLang="en-US" smtClean="0"/>
+              <a:rPr lang="zh-CN" altLang="en-US"/>
               <a:t>第四级</a:t>
             </a:r>
           </a:p>
           <a:p>
             <a:pPr lvl="4"/>
             <a:r>
-              <a:rPr lang="zh-CN" altLang="en-US" smtClean="0"/>
+              <a:rPr lang="zh-CN" altLang="en-US"/>
               <a:t>第五级</a:t>
             </a:r>
-            <a:endParaRPr lang="zh-CN" altLang="en-US"/>
           </a:p>
         </p:txBody>
       </p:sp>
@@ -5015,7 +5028,7 @@
           <a:p>
             <a:fld id="{8D0B3DFF-72D8-4763-AFA8-AF2C668498FE}" type="datetimeFigureOut">
               <a:rPr lang="zh-CN" altLang="en-US" smtClean="0"/>
-              <a:t>2018/2/26</a:t>
+              <a:t>2020/6/4</a:t>
             </a:fld>
             <a:endParaRPr lang="zh-CN" altLang="en-US"/>
           </a:p>
@@ -5500,6 +5513,63 @@
           </a:graphicData>
         </a:graphic>
       </p:graphicFrame>
+      <p:sp>
+        <p:nvSpPr>
+          <p:cNvPr id="3" name="矩形 2">
+            <a:extLst>
+              <a:ext uri="{FF2B5EF4-FFF2-40B4-BE49-F238E27FC236}">
+                <a16:creationId xmlns:a16="http://schemas.microsoft.com/office/drawing/2014/main" id="{3191F060-4EDF-204C-A0C5-A19CFDDCF444}"/>
+              </a:ext>
+            </a:extLst>
+          </p:cNvPr>
+          <p:cNvSpPr/>
+          <p:nvPr/>
+        </p:nvSpPr>
+        <p:spPr>
+          <a:xfrm>
+            <a:off x="838200" y="398463"/>
+            <a:ext cx="10708758" cy="5778500"/>
+          </a:xfrm>
+          <a:prstGeom prst="rect">
+            <a:avLst/>
+          </a:prstGeom>
+          <a:noFill/>
+          <a:ln w="12700">
+            <a:solidFill>
+              <a:schemeClr val="tx1"/>
+            </a:solidFill>
+            <a:prstDash val="dashDot"/>
+          </a:ln>
+        </p:spPr>
+        <p:style>
+          <a:lnRef idx="2">
+            <a:schemeClr val="accent1">
+              <a:shade val="50000"/>
+            </a:schemeClr>
+          </a:lnRef>
+          <a:fillRef idx="1">
+            <a:schemeClr val="accent1"/>
+          </a:fillRef>
+          <a:effectRef idx="0">
+            <a:schemeClr val="accent1"/>
+          </a:effectRef>
+          <a:fontRef idx="minor">
+            <a:schemeClr val="lt1"/>
+          </a:fontRef>
+        </p:style>
+        <p:txBody>
+          <a:bodyPr rtlCol="0" anchor="ctr"/>
+          <a:lstStyle/>
+          <a:p>
+            <a:pPr algn="ctr"/>
+            <a:endParaRPr lang="zh-CN" altLang="en-US" sz="900">
+              <a:solidFill>
+                <a:schemeClr val="tx1"/>
+              </a:solidFill>
+            </a:endParaRPr>
+          </a:p>
+        </p:txBody>
+      </p:sp>
     </p:spTree>
     <p:extLst>
       <p:ext uri="{BB962C8B-B14F-4D97-AF65-F5344CB8AC3E}">

</xml_diff>